<commit_message>
New updated comparison file. To do: cs recall precision in plot
</commit_message>
<xml_diff>
--- a/Presentation&Manuscript/PresentationMasterpractical.pptx
+++ b/Presentation&Manuscript/PresentationMasterpractical.pptx
@@ -4,8 +4,21 @@
   <p:sldMasterIdLst>
     <p:sldMasterId id="2147483648" r:id="rId1"/>
   </p:sldMasterIdLst>
+  <p:notesMasterIdLst>
+    <p:notesMasterId r:id="rId13"/>
+  </p:notesMasterIdLst>
   <p:sldIdLst>
     <p:sldId id="256" r:id="rId2"/>
+    <p:sldId id="257" r:id="rId3"/>
+    <p:sldId id="261" r:id="rId4"/>
+    <p:sldId id="258" r:id="rId5"/>
+    <p:sldId id="262" r:id="rId6"/>
+    <p:sldId id="259" r:id="rId7"/>
+    <p:sldId id="260" r:id="rId8"/>
+    <p:sldId id="267" r:id="rId9"/>
+    <p:sldId id="264" r:id="rId10"/>
+    <p:sldId id="266" r:id="rId11"/>
+    <p:sldId id="263" r:id="rId12"/>
   </p:sldIdLst>
   <p:sldSz cx="12192000" cy="6858000"/>
   <p:notesSz cx="6858000" cy="9144000"/>
@@ -112,6 +125,499 @@
 </p:presentation>
 </file>
 
+<file path=ppt/notesMasters/notesMaster1.xml><?xml version="1.0" encoding="utf-8"?>
+<p:notesMaster xmlns:a="http://schemas.openxmlformats.org/drawingml/2006/main" xmlns:r="http://schemas.openxmlformats.org/officeDocument/2006/relationships" xmlns:p="http://schemas.openxmlformats.org/presentationml/2006/main">
+  <p:cSld>
+    <p:bg>
+      <p:bgRef idx="1001">
+        <a:schemeClr val="bg1"/>
+      </p:bgRef>
+    </p:bg>
+    <p:spTree>
+      <p:nvGrpSpPr>
+        <p:cNvPr id="1" name=""/>
+        <p:cNvGrpSpPr/>
+        <p:nvPr/>
+      </p:nvGrpSpPr>
+      <p:grpSpPr>
+        <a:xfrm>
+          <a:off x="0" y="0"/>
+          <a:ext cx="0" cy="0"/>
+          <a:chOff x="0" y="0"/>
+          <a:chExt cx="0" cy="0"/>
+        </a:xfrm>
+      </p:grpSpPr>
+      <p:sp>
+        <p:nvSpPr>
+          <p:cNvPr id="2" name="Header Placeholder 1"/>
+          <p:cNvSpPr>
+            <a:spLocks noGrp="1"/>
+          </p:cNvSpPr>
+          <p:nvPr>
+            <p:ph type="hdr" sz="quarter"/>
+          </p:nvPr>
+        </p:nvSpPr>
+        <p:spPr>
+          <a:xfrm>
+            <a:off x="0" y="0"/>
+            <a:ext cx="2971800" cy="458788"/>
+          </a:xfrm>
+          <a:prstGeom prst="rect">
+            <a:avLst/>
+          </a:prstGeom>
+        </p:spPr>
+        <p:txBody>
+          <a:bodyPr vert="horz" lIns="91440" tIns="45720" rIns="91440" bIns="45720" rtlCol="0"/>
+          <a:lstStyle>
+            <a:lvl1pPr algn="l">
+              <a:defRPr sz="1200"/>
+            </a:lvl1pPr>
+          </a:lstStyle>
+          <a:p>
+            <a:endParaRPr lang="en-GB"/>
+          </a:p>
+        </p:txBody>
+      </p:sp>
+      <p:sp>
+        <p:nvSpPr>
+          <p:cNvPr id="3" name="Date Placeholder 2"/>
+          <p:cNvSpPr>
+            <a:spLocks noGrp="1"/>
+          </p:cNvSpPr>
+          <p:nvPr>
+            <p:ph type="dt" idx="1"/>
+          </p:nvPr>
+        </p:nvSpPr>
+        <p:spPr>
+          <a:xfrm>
+            <a:off x="3884613" y="0"/>
+            <a:ext cx="2971800" cy="458788"/>
+          </a:xfrm>
+          <a:prstGeom prst="rect">
+            <a:avLst/>
+          </a:prstGeom>
+        </p:spPr>
+        <p:txBody>
+          <a:bodyPr vert="horz" lIns="91440" tIns="45720" rIns="91440" bIns="45720" rtlCol="0"/>
+          <a:lstStyle>
+            <a:lvl1pPr algn="r">
+              <a:defRPr sz="1200"/>
+            </a:lvl1pPr>
+          </a:lstStyle>
+          <a:p>
+            <a:fld id="{38587B13-F4E3-41EF-B97E-23E77DE65602}" type="datetimeFigureOut">
+              <a:rPr lang="en-GB" smtClean="0"/>
+              <a:t>26/09/2019</a:t>
+            </a:fld>
+            <a:endParaRPr lang="en-GB"/>
+          </a:p>
+        </p:txBody>
+      </p:sp>
+      <p:sp>
+        <p:nvSpPr>
+          <p:cNvPr id="4" name="Slide Image Placeholder 3"/>
+          <p:cNvSpPr>
+            <a:spLocks noGrp="1" noRot="1" noChangeAspect="1"/>
+          </p:cNvSpPr>
+          <p:nvPr>
+            <p:ph type="sldImg" idx="2"/>
+          </p:nvPr>
+        </p:nvSpPr>
+        <p:spPr>
+          <a:xfrm>
+            <a:off x="685800" y="1143000"/>
+            <a:ext cx="5486400" cy="3086100"/>
+          </a:xfrm>
+          <a:prstGeom prst="rect">
+            <a:avLst/>
+          </a:prstGeom>
+          <a:noFill/>
+          <a:ln w="12700">
+            <a:solidFill>
+              <a:prstClr val="black"/>
+            </a:solidFill>
+          </a:ln>
+        </p:spPr>
+        <p:txBody>
+          <a:bodyPr vert="horz" lIns="91440" tIns="45720" rIns="91440" bIns="45720" rtlCol="0" anchor="ctr"/>
+          <a:lstStyle/>
+          <a:p>
+            <a:endParaRPr lang="en-GB"/>
+          </a:p>
+        </p:txBody>
+      </p:sp>
+      <p:sp>
+        <p:nvSpPr>
+          <p:cNvPr id="5" name="Notes Placeholder 4"/>
+          <p:cNvSpPr>
+            <a:spLocks noGrp="1"/>
+          </p:cNvSpPr>
+          <p:nvPr>
+            <p:ph type="body" sz="quarter" idx="3"/>
+          </p:nvPr>
+        </p:nvSpPr>
+        <p:spPr>
+          <a:xfrm>
+            <a:off x="685800" y="4400550"/>
+            <a:ext cx="5486400" cy="3600450"/>
+          </a:xfrm>
+          <a:prstGeom prst="rect">
+            <a:avLst/>
+          </a:prstGeom>
+        </p:spPr>
+        <p:txBody>
+          <a:bodyPr vert="horz" lIns="91440" tIns="45720" rIns="91440" bIns="45720" rtlCol="0"/>
+          <a:lstStyle/>
+          <a:p>
+            <a:pPr lvl="0"/>
+            <a:r>
+              <a:rPr lang="en-US"/>
+              <a:t>Click to edit Master text styles</a:t>
+            </a:r>
+          </a:p>
+          <a:p>
+            <a:pPr lvl="1"/>
+            <a:r>
+              <a:rPr lang="en-US"/>
+              <a:t>Second level</a:t>
+            </a:r>
+          </a:p>
+          <a:p>
+            <a:pPr lvl="2"/>
+            <a:r>
+              <a:rPr lang="en-US"/>
+              <a:t>Third level</a:t>
+            </a:r>
+          </a:p>
+          <a:p>
+            <a:pPr lvl="3"/>
+            <a:r>
+              <a:rPr lang="en-US"/>
+              <a:t>Fourth level</a:t>
+            </a:r>
+          </a:p>
+          <a:p>
+            <a:pPr lvl="4"/>
+            <a:r>
+              <a:rPr lang="en-US"/>
+              <a:t>Fifth level</a:t>
+            </a:r>
+            <a:endParaRPr lang="en-GB"/>
+          </a:p>
+        </p:txBody>
+      </p:sp>
+      <p:sp>
+        <p:nvSpPr>
+          <p:cNvPr id="6" name="Footer Placeholder 5"/>
+          <p:cNvSpPr>
+            <a:spLocks noGrp="1"/>
+          </p:cNvSpPr>
+          <p:nvPr>
+            <p:ph type="ftr" sz="quarter" idx="4"/>
+          </p:nvPr>
+        </p:nvSpPr>
+        <p:spPr>
+          <a:xfrm>
+            <a:off x="0" y="8685213"/>
+            <a:ext cx="2971800" cy="458787"/>
+          </a:xfrm>
+          <a:prstGeom prst="rect">
+            <a:avLst/>
+          </a:prstGeom>
+        </p:spPr>
+        <p:txBody>
+          <a:bodyPr vert="horz" lIns="91440" tIns="45720" rIns="91440" bIns="45720" rtlCol="0" anchor="b"/>
+          <a:lstStyle>
+            <a:lvl1pPr algn="l">
+              <a:defRPr sz="1200"/>
+            </a:lvl1pPr>
+          </a:lstStyle>
+          <a:p>
+            <a:endParaRPr lang="en-GB"/>
+          </a:p>
+        </p:txBody>
+      </p:sp>
+      <p:sp>
+        <p:nvSpPr>
+          <p:cNvPr id="7" name="Slide Number Placeholder 6"/>
+          <p:cNvSpPr>
+            <a:spLocks noGrp="1"/>
+          </p:cNvSpPr>
+          <p:nvPr>
+            <p:ph type="sldNum" sz="quarter" idx="5"/>
+          </p:nvPr>
+        </p:nvSpPr>
+        <p:spPr>
+          <a:xfrm>
+            <a:off x="3884613" y="8685213"/>
+            <a:ext cx="2971800" cy="458787"/>
+          </a:xfrm>
+          <a:prstGeom prst="rect">
+            <a:avLst/>
+          </a:prstGeom>
+        </p:spPr>
+        <p:txBody>
+          <a:bodyPr vert="horz" lIns="91440" tIns="45720" rIns="91440" bIns="45720" rtlCol="0" anchor="b"/>
+          <a:lstStyle>
+            <a:lvl1pPr algn="r">
+              <a:defRPr sz="1200"/>
+            </a:lvl1pPr>
+          </a:lstStyle>
+          <a:p>
+            <a:fld id="{2ECF7F56-EC5E-41E1-B7E5-8B5DB85BB117}" type="slidenum">
+              <a:rPr lang="en-GB" smtClean="0"/>
+              <a:t>‹#›</a:t>
+            </a:fld>
+            <a:endParaRPr lang="en-GB"/>
+          </a:p>
+        </p:txBody>
+      </p:sp>
+    </p:spTree>
+    <p:extLst>
+      <p:ext uri="{BB962C8B-B14F-4D97-AF65-F5344CB8AC3E}">
+        <p14:creationId xmlns:p14="http://schemas.microsoft.com/office/powerpoint/2010/main" val="1268291485"/>
+      </p:ext>
+    </p:extLst>
+  </p:cSld>
+  <p:clrMap bg1="lt1" tx1="dk1" bg2="lt2" tx2="dk2" accent1="accent1" accent2="accent2" accent3="accent3" accent4="accent4" accent5="accent5" accent6="accent6" hlink="hlink" folHlink="folHlink"/>
+  <p:notesStyle>
+    <a:lvl1pPr marL="0" algn="l" defTabSz="914400" rtl="0" eaLnBrk="1" latinLnBrk="0" hangingPunct="1">
+      <a:defRPr sz="1200" kern="1200">
+        <a:solidFill>
+          <a:schemeClr val="tx1"/>
+        </a:solidFill>
+        <a:latin typeface="+mn-lt"/>
+        <a:ea typeface="+mn-ea"/>
+        <a:cs typeface="+mn-cs"/>
+      </a:defRPr>
+    </a:lvl1pPr>
+    <a:lvl2pPr marL="457200" algn="l" defTabSz="914400" rtl="0" eaLnBrk="1" latinLnBrk="0" hangingPunct="1">
+      <a:defRPr sz="1200" kern="1200">
+        <a:solidFill>
+          <a:schemeClr val="tx1"/>
+        </a:solidFill>
+        <a:latin typeface="+mn-lt"/>
+        <a:ea typeface="+mn-ea"/>
+        <a:cs typeface="+mn-cs"/>
+      </a:defRPr>
+    </a:lvl2pPr>
+    <a:lvl3pPr marL="914400" algn="l" defTabSz="914400" rtl="0" eaLnBrk="1" latinLnBrk="0" hangingPunct="1">
+      <a:defRPr sz="1200" kern="1200">
+        <a:solidFill>
+          <a:schemeClr val="tx1"/>
+        </a:solidFill>
+        <a:latin typeface="+mn-lt"/>
+        <a:ea typeface="+mn-ea"/>
+        <a:cs typeface="+mn-cs"/>
+      </a:defRPr>
+    </a:lvl3pPr>
+    <a:lvl4pPr marL="1371600" algn="l" defTabSz="914400" rtl="0" eaLnBrk="1" latinLnBrk="0" hangingPunct="1">
+      <a:defRPr sz="1200" kern="1200">
+        <a:solidFill>
+          <a:schemeClr val="tx1"/>
+        </a:solidFill>
+        <a:latin typeface="+mn-lt"/>
+        <a:ea typeface="+mn-ea"/>
+        <a:cs typeface="+mn-cs"/>
+      </a:defRPr>
+    </a:lvl4pPr>
+    <a:lvl5pPr marL="1828800" algn="l" defTabSz="914400" rtl="0" eaLnBrk="1" latinLnBrk="0" hangingPunct="1">
+      <a:defRPr sz="1200" kern="1200">
+        <a:solidFill>
+          <a:schemeClr val="tx1"/>
+        </a:solidFill>
+        <a:latin typeface="+mn-lt"/>
+        <a:ea typeface="+mn-ea"/>
+        <a:cs typeface="+mn-cs"/>
+      </a:defRPr>
+    </a:lvl5pPr>
+    <a:lvl6pPr marL="2286000" algn="l" defTabSz="914400" rtl="0" eaLnBrk="1" latinLnBrk="0" hangingPunct="1">
+      <a:defRPr sz="1200" kern="1200">
+        <a:solidFill>
+          <a:schemeClr val="tx1"/>
+        </a:solidFill>
+        <a:latin typeface="+mn-lt"/>
+        <a:ea typeface="+mn-ea"/>
+        <a:cs typeface="+mn-cs"/>
+      </a:defRPr>
+    </a:lvl6pPr>
+    <a:lvl7pPr marL="2743200" algn="l" defTabSz="914400" rtl="0" eaLnBrk="1" latinLnBrk="0" hangingPunct="1">
+      <a:defRPr sz="1200" kern="1200">
+        <a:solidFill>
+          <a:schemeClr val="tx1"/>
+        </a:solidFill>
+        <a:latin typeface="+mn-lt"/>
+        <a:ea typeface="+mn-ea"/>
+        <a:cs typeface="+mn-cs"/>
+      </a:defRPr>
+    </a:lvl7pPr>
+    <a:lvl8pPr marL="3200400" algn="l" defTabSz="914400" rtl="0" eaLnBrk="1" latinLnBrk="0" hangingPunct="1">
+      <a:defRPr sz="1200" kern="1200">
+        <a:solidFill>
+          <a:schemeClr val="tx1"/>
+        </a:solidFill>
+        <a:latin typeface="+mn-lt"/>
+        <a:ea typeface="+mn-ea"/>
+        <a:cs typeface="+mn-cs"/>
+      </a:defRPr>
+    </a:lvl8pPr>
+    <a:lvl9pPr marL="3657600" algn="l" defTabSz="914400" rtl="0" eaLnBrk="1" latinLnBrk="0" hangingPunct="1">
+      <a:defRPr sz="1200" kern="1200">
+        <a:solidFill>
+          <a:schemeClr val="tx1"/>
+        </a:solidFill>
+        <a:latin typeface="+mn-lt"/>
+        <a:ea typeface="+mn-ea"/>
+        <a:cs typeface="+mn-cs"/>
+      </a:defRPr>
+    </a:lvl9pPr>
+  </p:notesStyle>
+</p:notesMaster>
+</file>
+
+<file path=ppt/notesSlides/notesSlide1.xml><?xml version="1.0" encoding="utf-8"?>
+<p:notes xmlns:a="http://schemas.openxmlformats.org/drawingml/2006/main" xmlns:r="http://schemas.openxmlformats.org/officeDocument/2006/relationships" xmlns:p="http://schemas.openxmlformats.org/presentationml/2006/main">
+  <p:cSld>
+    <p:spTree>
+      <p:nvGrpSpPr>
+        <p:cNvPr id="1" name=""/>
+        <p:cNvGrpSpPr/>
+        <p:nvPr/>
+      </p:nvGrpSpPr>
+      <p:grpSpPr>
+        <a:xfrm>
+          <a:off x="0" y="0"/>
+          <a:ext cx="0" cy="0"/>
+          <a:chOff x="0" y="0"/>
+          <a:chExt cx="0" cy="0"/>
+        </a:xfrm>
+      </p:grpSpPr>
+      <p:sp>
+        <p:nvSpPr>
+          <p:cNvPr id="2" name="Slide Image Placeholder 1"/>
+          <p:cNvSpPr>
+            <a:spLocks noGrp="1" noRot="1" noChangeAspect="1"/>
+          </p:cNvSpPr>
+          <p:nvPr>
+            <p:ph type="sldImg"/>
+          </p:nvPr>
+        </p:nvSpPr>
+        <p:spPr/>
+      </p:sp>
+      <p:sp>
+        <p:nvSpPr>
+          <p:cNvPr id="3" name="Notes Placeholder 2"/>
+          <p:cNvSpPr>
+            <a:spLocks noGrp="1"/>
+          </p:cNvSpPr>
+          <p:nvPr>
+            <p:ph type="body" idx="1"/>
+          </p:nvPr>
+        </p:nvSpPr>
+        <p:spPr/>
+        <p:txBody>
+          <a:bodyPr/>
+          <a:lstStyle/>
+          <a:p>
+            <a:pPr marL="0" marR="0" lvl="0" indent="0" algn="l" defTabSz="914400" rtl="0" eaLnBrk="1" fontAlgn="auto" latinLnBrk="0" hangingPunct="1">
+              <a:lnSpc>
+                <a:spcPct val="100000"/>
+              </a:lnSpc>
+              <a:spcBef>
+                <a:spcPts val="0"/>
+              </a:spcBef>
+              <a:spcAft>
+                <a:spcPts val="0"/>
+              </a:spcAft>
+              <a:buClrTx/>
+              <a:buSzTx/>
+              <a:buFontTx/>
+              <a:buNone/>
+              <a:tabLst/>
+              <a:defRPr/>
+            </a:pPr>
+            <a:r>
+              <a:rPr lang="en-US" dirty="0"/>
+              <a:t>lipoprotein signal peptides transported by the Sec </a:t>
+            </a:r>
+            <a:r>
+              <a:rPr lang="en-US" dirty="0" err="1"/>
+              <a:t>translocon</a:t>
+            </a:r>
+            <a:r>
+              <a:rPr lang="en-US" dirty="0"/>
+              <a:t> and cleaved by Signal Peptidase II (</a:t>
+            </a:r>
+            <a:r>
+              <a:rPr lang="en-US" dirty="0" err="1"/>
+              <a:t>Lsp</a:t>
+            </a:r>
+            <a:r>
+              <a:rPr lang="en-US" dirty="0"/>
+              <a:t>)</a:t>
+            </a:r>
+          </a:p>
+          <a:p>
+            <a:r>
+              <a:rPr lang="en-US" dirty="0"/>
+              <a:t>Tat signal peptides transported by the Tat </a:t>
+            </a:r>
+            <a:r>
+              <a:rPr lang="en-US" dirty="0" err="1"/>
+              <a:t>translocon</a:t>
+            </a:r>
+            <a:r>
+              <a:rPr lang="en-US" dirty="0"/>
+              <a:t> and cleaved by Signal Peptidase I (</a:t>
+            </a:r>
+            <a:r>
+              <a:rPr lang="en-US" dirty="0" err="1"/>
+              <a:t>Lep</a:t>
+            </a:r>
+            <a:r>
+              <a:rPr lang="en-US" dirty="0"/>
+              <a:t>)</a:t>
+            </a:r>
+            <a:endParaRPr lang="en-GB" dirty="0"/>
+          </a:p>
+        </p:txBody>
+      </p:sp>
+      <p:sp>
+        <p:nvSpPr>
+          <p:cNvPr id="4" name="Slide Number Placeholder 3"/>
+          <p:cNvSpPr>
+            <a:spLocks noGrp="1"/>
+          </p:cNvSpPr>
+          <p:nvPr>
+            <p:ph type="sldNum" sz="quarter" idx="5"/>
+          </p:nvPr>
+        </p:nvSpPr>
+        <p:spPr/>
+        <p:txBody>
+          <a:bodyPr/>
+          <a:lstStyle/>
+          <a:p>
+            <a:fld id="{2ECF7F56-EC5E-41E1-B7E5-8B5DB85BB117}" type="slidenum">
+              <a:rPr lang="en-GB" smtClean="0"/>
+              <a:t>4</a:t>
+            </a:fld>
+            <a:endParaRPr lang="en-GB"/>
+          </a:p>
+        </p:txBody>
+      </p:sp>
+    </p:spTree>
+    <p:extLst>
+      <p:ext uri="{BB962C8B-B14F-4D97-AF65-F5344CB8AC3E}">
+        <p14:creationId xmlns:p14="http://schemas.microsoft.com/office/powerpoint/2010/main" val="1301244831"/>
+      </p:ext>
+    </p:extLst>
+  </p:cSld>
+  <p:clrMapOvr>
+    <a:masterClrMapping/>
+  </p:clrMapOvr>
+</p:notes>
+</file>
+
 <file path=ppt/slideLayouts/slideLayout1.xml><?xml version="1.0" encoding="utf-8"?>
 <p:sldLayout xmlns:a="http://schemas.openxmlformats.org/drawingml/2006/main" xmlns:r="http://schemas.openxmlformats.org/officeDocument/2006/relationships" xmlns:p="http://schemas.openxmlformats.org/presentationml/2006/main" type="title" preserve="1">
   <p:cSld name="Title Slide">
@@ -261,7 +767,7 @@
           <a:p>
             <a:fld id="{958EC032-48E4-4350-885B-A3648E506201}" type="datetimeFigureOut">
               <a:rPr lang="en-GB" smtClean="0"/>
-              <a:t>04/09/2019</a:t>
+              <a:t>26/09/2019</a:t>
             </a:fld>
             <a:endParaRPr lang="en-GB"/>
           </a:p>
@@ -461,7 +967,7 @@
           <a:p>
             <a:fld id="{958EC032-48E4-4350-885B-A3648E506201}" type="datetimeFigureOut">
               <a:rPr lang="en-GB" smtClean="0"/>
-              <a:t>04/09/2019</a:t>
+              <a:t>26/09/2019</a:t>
             </a:fld>
             <a:endParaRPr lang="en-GB"/>
           </a:p>
@@ -671,7 +1177,7 @@
           <a:p>
             <a:fld id="{958EC032-48E4-4350-885B-A3648E506201}" type="datetimeFigureOut">
               <a:rPr lang="en-GB" smtClean="0"/>
-              <a:t>04/09/2019</a:t>
+              <a:t>26/09/2019</a:t>
             </a:fld>
             <a:endParaRPr lang="en-GB"/>
           </a:p>
@@ -871,7 +1377,7 @@
           <a:p>
             <a:fld id="{958EC032-48E4-4350-885B-A3648E506201}" type="datetimeFigureOut">
               <a:rPr lang="en-GB" smtClean="0"/>
-              <a:t>04/09/2019</a:t>
+              <a:t>26/09/2019</a:t>
             </a:fld>
             <a:endParaRPr lang="en-GB"/>
           </a:p>
@@ -1147,7 +1653,7 @@
           <a:p>
             <a:fld id="{958EC032-48E4-4350-885B-A3648E506201}" type="datetimeFigureOut">
               <a:rPr lang="en-GB" smtClean="0"/>
-              <a:t>04/09/2019</a:t>
+              <a:t>26/09/2019</a:t>
             </a:fld>
             <a:endParaRPr lang="en-GB"/>
           </a:p>
@@ -1415,7 +1921,7 @@
           <a:p>
             <a:fld id="{958EC032-48E4-4350-885B-A3648E506201}" type="datetimeFigureOut">
               <a:rPr lang="en-GB" smtClean="0"/>
-              <a:t>04/09/2019</a:t>
+              <a:t>26/09/2019</a:t>
             </a:fld>
             <a:endParaRPr lang="en-GB"/>
           </a:p>
@@ -1830,7 +2336,7 @@
           <a:p>
             <a:fld id="{958EC032-48E4-4350-885B-A3648E506201}" type="datetimeFigureOut">
               <a:rPr lang="en-GB" smtClean="0"/>
-              <a:t>04/09/2019</a:t>
+              <a:t>26/09/2019</a:t>
             </a:fld>
             <a:endParaRPr lang="en-GB"/>
           </a:p>
@@ -1972,7 +2478,7 @@
           <a:p>
             <a:fld id="{958EC032-48E4-4350-885B-A3648E506201}" type="datetimeFigureOut">
               <a:rPr lang="en-GB" smtClean="0"/>
-              <a:t>04/09/2019</a:t>
+              <a:t>26/09/2019</a:t>
             </a:fld>
             <a:endParaRPr lang="en-GB"/>
           </a:p>
@@ -2085,7 +2591,7 @@
           <a:p>
             <a:fld id="{958EC032-48E4-4350-885B-A3648E506201}" type="datetimeFigureOut">
               <a:rPr lang="en-GB" smtClean="0"/>
-              <a:t>04/09/2019</a:t>
+              <a:t>26/09/2019</a:t>
             </a:fld>
             <a:endParaRPr lang="en-GB"/>
           </a:p>
@@ -2398,7 +2904,7 @@
           <a:p>
             <a:fld id="{958EC032-48E4-4350-885B-A3648E506201}" type="datetimeFigureOut">
               <a:rPr lang="en-GB" smtClean="0"/>
-              <a:t>04/09/2019</a:t>
+              <a:t>26/09/2019</a:t>
             </a:fld>
             <a:endParaRPr lang="en-GB"/>
           </a:p>
@@ -2687,7 +3193,7 @@
           <a:p>
             <a:fld id="{958EC032-48E4-4350-885B-A3648E506201}" type="datetimeFigureOut">
               <a:rPr lang="en-GB" smtClean="0"/>
-              <a:t>04/09/2019</a:t>
+              <a:t>26/09/2019</a:t>
             </a:fld>
             <a:endParaRPr lang="en-GB"/>
           </a:p>
@@ -2930,7 +3436,7 @@
           <a:p>
             <a:fld id="{958EC032-48E4-4350-885B-A3648E506201}" type="datetimeFigureOut">
               <a:rPr lang="en-GB" smtClean="0"/>
-              <a:t>04/09/2019</a:t>
+              <a:t>26/09/2019</a:t>
             </a:fld>
             <a:endParaRPr lang="en-GB"/>
           </a:p>
@@ -3408,8 +3914,13 @@
           <a:p>
             <a:r>
               <a:rPr lang="en-GB" dirty="0"/>
-              <a:t>Signal peptide prediction with Sec2Vec</a:t>
-            </a:r>
+              <a:t>Signal peptide prediction with </a:t>
+            </a:r>
+            <a:r>
+              <a:rPr lang="en-GB" dirty="0" err="1"/>
+              <a:t>SecVec</a:t>
+            </a:r>
+            <a:endParaRPr lang="en-GB" dirty="0"/>
           </a:p>
         </p:txBody>
       </p:sp>
@@ -3483,6 +3994,1230 @@
     <p:extLst>
       <p:ext uri="{BB962C8B-B14F-4D97-AF65-F5344CB8AC3E}">
         <p14:creationId xmlns:p14="http://schemas.microsoft.com/office/powerpoint/2010/main" val="466190227"/>
+      </p:ext>
+    </p:extLst>
+  </p:cSld>
+  <p:clrMapOvr>
+    <a:masterClrMapping/>
+  </p:clrMapOvr>
+</p:sld>
+</file>
+
+<file path=ppt/slides/slide10.xml><?xml version="1.0" encoding="utf-8"?>
+<p:sld xmlns:a="http://schemas.openxmlformats.org/drawingml/2006/main" xmlns:r="http://schemas.openxmlformats.org/officeDocument/2006/relationships" xmlns:p="http://schemas.openxmlformats.org/presentationml/2006/main">
+  <p:cSld>
+    <p:spTree>
+      <p:nvGrpSpPr>
+        <p:cNvPr id="1" name=""/>
+        <p:cNvGrpSpPr/>
+        <p:nvPr/>
+      </p:nvGrpSpPr>
+      <p:grpSpPr>
+        <a:xfrm>
+          <a:off x="0" y="0"/>
+          <a:ext cx="0" cy="0"/>
+          <a:chOff x="0" y="0"/>
+          <a:chExt cx="0" cy="0"/>
+        </a:xfrm>
+      </p:grpSpPr>
+      <p:pic>
+        <p:nvPicPr>
+          <p:cNvPr id="4" name="Content Placeholder 3">
+            <a:extLst>
+              <a:ext uri="{FF2B5EF4-FFF2-40B4-BE49-F238E27FC236}">
+                <a16:creationId xmlns:a16="http://schemas.microsoft.com/office/drawing/2014/main" id="{833BE139-5838-4048-9DFE-ABD8A54FD89B}"/>
+              </a:ext>
+            </a:extLst>
+          </p:cNvPr>
+          <p:cNvPicPr>
+            <a:picLocks noGrp="1" noChangeAspect="1"/>
+          </p:cNvPicPr>
+          <p:nvPr>
+            <p:ph idx="1"/>
+          </p:nvPr>
+        </p:nvPicPr>
+        <p:blipFill>
+          <a:blip r:embed="rId2">
+            <a:extLst>
+              <a:ext uri="{28A0092B-C50C-407E-A947-70E740481C1C}">
+                <a14:useLocalDpi xmlns:a14="http://schemas.microsoft.com/office/drawing/2010/main" val="0"/>
+              </a:ext>
+            </a:extLst>
+          </a:blip>
+          <a:stretch>
+            <a:fillRect/>
+          </a:stretch>
+        </p:blipFill>
+        <p:spPr>
+          <a:xfrm>
+            <a:off x="-2461" y="1690688"/>
+            <a:ext cx="6287409" cy="4191607"/>
+          </a:xfrm>
+        </p:spPr>
+      </p:pic>
+      <p:sp>
+        <p:nvSpPr>
+          <p:cNvPr id="7" name="Title 1">
+            <a:extLst>
+              <a:ext uri="{FF2B5EF4-FFF2-40B4-BE49-F238E27FC236}">
+                <a16:creationId xmlns:a16="http://schemas.microsoft.com/office/drawing/2014/main" id="{53B0E661-EFEB-4B87-9709-69EEA27CE22B}"/>
+              </a:ext>
+            </a:extLst>
+          </p:cNvPr>
+          <p:cNvSpPr>
+            <a:spLocks noGrp="1"/>
+          </p:cNvSpPr>
+          <p:nvPr>
+            <p:ph type="title"/>
+          </p:nvPr>
+        </p:nvSpPr>
+        <p:spPr>
+          <a:xfrm>
+            <a:off x="838200" y="365125"/>
+            <a:ext cx="10515600" cy="1325563"/>
+          </a:xfrm>
+        </p:spPr>
+        <p:txBody>
+          <a:bodyPr/>
+          <a:lstStyle/>
+          <a:p>
+            <a:r>
+              <a:rPr lang="en-GB" dirty="0"/>
+              <a:t>Results without and with a CRF: global MCC</a:t>
+            </a:r>
+          </a:p>
+        </p:txBody>
+      </p:sp>
+      <p:pic>
+        <p:nvPicPr>
+          <p:cNvPr id="6" name="Picture 5">
+            <a:extLst>
+              <a:ext uri="{FF2B5EF4-FFF2-40B4-BE49-F238E27FC236}">
+                <a16:creationId xmlns:a16="http://schemas.microsoft.com/office/drawing/2014/main" id="{BD43821F-C543-40F2-A155-0BBEACFAD147}"/>
+              </a:ext>
+            </a:extLst>
+          </p:cNvPr>
+          <p:cNvPicPr>
+            <a:picLocks noChangeAspect="1"/>
+          </p:cNvPicPr>
+          <p:nvPr/>
+        </p:nvPicPr>
+        <p:blipFill>
+          <a:blip r:embed="rId3">
+            <a:extLst>
+              <a:ext uri="{28A0092B-C50C-407E-A947-70E740481C1C}">
+                <a14:useLocalDpi xmlns:a14="http://schemas.microsoft.com/office/drawing/2010/main" val="0"/>
+              </a:ext>
+            </a:extLst>
+          </a:blip>
+          <a:stretch>
+            <a:fillRect/>
+          </a:stretch>
+        </p:blipFill>
+        <p:spPr>
+          <a:xfrm>
+            <a:off x="5904589" y="1690688"/>
+            <a:ext cx="6287411" cy="4191607"/>
+          </a:xfrm>
+          <a:prstGeom prst="rect">
+            <a:avLst/>
+          </a:prstGeom>
+        </p:spPr>
+      </p:pic>
+    </p:spTree>
+    <p:extLst>
+      <p:ext uri="{BB962C8B-B14F-4D97-AF65-F5344CB8AC3E}">
+        <p14:creationId xmlns:p14="http://schemas.microsoft.com/office/powerpoint/2010/main" val="298631003"/>
+      </p:ext>
+    </p:extLst>
+  </p:cSld>
+  <p:clrMapOvr>
+    <a:masterClrMapping/>
+  </p:clrMapOvr>
+</p:sld>
+</file>
+
+<file path=ppt/slides/slide11.xml><?xml version="1.0" encoding="utf-8"?>
+<p:sld xmlns:a="http://schemas.openxmlformats.org/drawingml/2006/main" xmlns:r="http://schemas.openxmlformats.org/officeDocument/2006/relationships" xmlns:p="http://schemas.openxmlformats.org/presentationml/2006/main">
+  <p:cSld>
+    <p:spTree>
+      <p:nvGrpSpPr>
+        <p:cNvPr id="1" name=""/>
+        <p:cNvGrpSpPr/>
+        <p:nvPr/>
+      </p:nvGrpSpPr>
+      <p:grpSpPr>
+        <a:xfrm>
+          <a:off x="0" y="0"/>
+          <a:ext cx="0" cy="0"/>
+          <a:chOff x="0" y="0"/>
+          <a:chExt cx="0" cy="0"/>
+        </a:xfrm>
+      </p:grpSpPr>
+      <p:sp>
+        <p:nvSpPr>
+          <p:cNvPr id="2" name="Title 1">
+            <a:extLst>
+              <a:ext uri="{FF2B5EF4-FFF2-40B4-BE49-F238E27FC236}">
+                <a16:creationId xmlns:a16="http://schemas.microsoft.com/office/drawing/2014/main" id="{2E630BD5-03BD-4417-B3EA-B4DF30EE0140}"/>
+              </a:ext>
+            </a:extLst>
+          </p:cNvPr>
+          <p:cNvSpPr>
+            <a:spLocks noGrp="1"/>
+          </p:cNvSpPr>
+          <p:nvPr>
+            <p:ph type="title"/>
+          </p:nvPr>
+        </p:nvSpPr>
+        <p:spPr>
+          <a:xfrm>
+            <a:off x="838200" y="365125"/>
+            <a:ext cx="10515600" cy="1325563"/>
+          </a:xfrm>
+        </p:spPr>
+        <p:txBody>
+          <a:bodyPr/>
+          <a:lstStyle/>
+          <a:p>
+            <a:r>
+              <a:rPr lang="en-GB" dirty="0"/>
+              <a:t>Results without and with a CRF: cleavage site</a:t>
+            </a:r>
+          </a:p>
+        </p:txBody>
+      </p:sp>
+      <p:pic>
+        <p:nvPicPr>
+          <p:cNvPr id="5" name="Content Placeholder 4">
+            <a:extLst>
+              <a:ext uri="{FF2B5EF4-FFF2-40B4-BE49-F238E27FC236}">
+                <a16:creationId xmlns:a16="http://schemas.microsoft.com/office/drawing/2014/main" id="{18E03E75-1A19-4E5E-B924-C221F7E88E16}"/>
+              </a:ext>
+            </a:extLst>
+          </p:cNvPr>
+          <p:cNvPicPr>
+            <a:picLocks noGrp="1" noChangeAspect="1"/>
+          </p:cNvPicPr>
+          <p:nvPr>
+            <p:ph idx="1"/>
+          </p:nvPr>
+        </p:nvPicPr>
+        <p:blipFill>
+          <a:blip r:embed="rId2">
+            <a:extLst>
+              <a:ext uri="{28A0092B-C50C-407E-A947-70E740481C1C}">
+                <a14:useLocalDpi xmlns:a14="http://schemas.microsoft.com/office/drawing/2010/main" val="0"/>
+              </a:ext>
+            </a:extLst>
+          </a:blip>
+          <a:stretch>
+            <a:fillRect/>
+          </a:stretch>
+        </p:blipFill>
+        <p:spPr>
+          <a:xfrm>
+            <a:off x="168257" y="1774428"/>
+            <a:ext cx="5927743" cy="4404699"/>
+          </a:xfrm>
+        </p:spPr>
+      </p:pic>
+      <p:pic>
+        <p:nvPicPr>
+          <p:cNvPr id="7" name="Picture 6">
+            <a:extLst>
+              <a:ext uri="{FF2B5EF4-FFF2-40B4-BE49-F238E27FC236}">
+                <a16:creationId xmlns:a16="http://schemas.microsoft.com/office/drawing/2014/main" id="{7CFCE6CC-C6EB-4384-B937-5CBBC9B87E1E}"/>
+              </a:ext>
+            </a:extLst>
+          </p:cNvPr>
+          <p:cNvPicPr>
+            <a:picLocks noChangeAspect="1"/>
+          </p:cNvPicPr>
+          <p:nvPr/>
+        </p:nvPicPr>
+        <p:blipFill>
+          <a:blip r:embed="rId3">
+            <a:extLst>
+              <a:ext uri="{28A0092B-C50C-407E-A947-70E740481C1C}">
+                <a14:useLocalDpi xmlns:a14="http://schemas.microsoft.com/office/drawing/2010/main" val="0"/>
+              </a:ext>
+            </a:extLst>
+          </a:blip>
+          <a:stretch>
+            <a:fillRect/>
+          </a:stretch>
+        </p:blipFill>
+        <p:spPr>
+          <a:xfrm>
+            <a:off x="6096000" y="1774428"/>
+            <a:ext cx="5927743" cy="4404699"/>
+          </a:xfrm>
+          <a:prstGeom prst="rect">
+            <a:avLst/>
+          </a:prstGeom>
+        </p:spPr>
+      </p:pic>
+    </p:spTree>
+    <p:extLst>
+      <p:ext uri="{BB962C8B-B14F-4D97-AF65-F5344CB8AC3E}">
+        <p14:creationId xmlns:p14="http://schemas.microsoft.com/office/powerpoint/2010/main" val="2607779076"/>
+      </p:ext>
+    </p:extLst>
+  </p:cSld>
+  <p:clrMapOvr>
+    <a:masterClrMapping/>
+  </p:clrMapOvr>
+</p:sld>
+</file>
+
+<file path=ppt/slides/slide2.xml><?xml version="1.0" encoding="utf-8"?>
+<p:sld xmlns:a="http://schemas.openxmlformats.org/drawingml/2006/main" xmlns:r="http://schemas.openxmlformats.org/officeDocument/2006/relationships" xmlns:p="http://schemas.openxmlformats.org/presentationml/2006/main">
+  <p:cSld>
+    <p:spTree>
+      <p:nvGrpSpPr>
+        <p:cNvPr id="1" name=""/>
+        <p:cNvGrpSpPr/>
+        <p:nvPr/>
+      </p:nvGrpSpPr>
+      <p:grpSpPr>
+        <a:xfrm>
+          <a:off x="0" y="0"/>
+          <a:ext cx="0" cy="0"/>
+          <a:chOff x="0" y="0"/>
+          <a:chExt cx="0" cy="0"/>
+        </a:xfrm>
+      </p:grpSpPr>
+      <p:sp>
+        <p:nvSpPr>
+          <p:cNvPr id="2" name="Title 1">
+            <a:extLst>
+              <a:ext uri="{FF2B5EF4-FFF2-40B4-BE49-F238E27FC236}">
+                <a16:creationId xmlns:a16="http://schemas.microsoft.com/office/drawing/2014/main" id="{1EE104B8-7ED1-4547-A3B9-594DDA993C27}"/>
+              </a:ext>
+            </a:extLst>
+          </p:cNvPr>
+          <p:cNvSpPr>
+            <a:spLocks noGrp="1"/>
+          </p:cNvSpPr>
+          <p:nvPr>
+            <p:ph type="title"/>
+          </p:nvPr>
+        </p:nvSpPr>
+        <p:spPr/>
+        <p:txBody>
+          <a:bodyPr/>
+          <a:lstStyle/>
+          <a:p>
+            <a:r>
+              <a:rPr lang="en-GB" dirty="0"/>
+              <a:t>Background </a:t>
+            </a:r>
+          </a:p>
+        </p:txBody>
+      </p:sp>
+      <p:sp>
+        <p:nvSpPr>
+          <p:cNvPr id="3" name="Content Placeholder 2">
+            <a:extLst>
+              <a:ext uri="{FF2B5EF4-FFF2-40B4-BE49-F238E27FC236}">
+                <a16:creationId xmlns:a16="http://schemas.microsoft.com/office/drawing/2014/main" id="{0A43ED91-00C3-4E05-8B8C-B1A61BE19234}"/>
+              </a:ext>
+            </a:extLst>
+          </p:cNvPr>
+          <p:cNvSpPr>
+            <a:spLocks noGrp="1"/>
+          </p:cNvSpPr>
+          <p:nvPr>
+            <p:ph idx="1"/>
+          </p:nvPr>
+        </p:nvSpPr>
+        <p:spPr/>
+        <p:txBody>
+          <a:bodyPr/>
+          <a:lstStyle/>
+          <a:p>
+            <a:endParaRPr lang="en-GB" dirty="0"/>
+          </a:p>
+        </p:txBody>
+      </p:sp>
+    </p:spTree>
+    <p:extLst>
+      <p:ext uri="{BB962C8B-B14F-4D97-AF65-F5344CB8AC3E}">
+        <p14:creationId xmlns:p14="http://schemas.microsoft.com/office/powerpoint/2010/main" val="3526880644"/>
+      </p:ext>
+    </p:extLst>
+  </p:cSld>
+  <p:clrMapOvr>
+    <a:masterClrMapping/>
+  </p:clrMapOvr>
+</p:sld>
+</file>
+
+<file path=ppt/slides/slide3.xml><?xml version="1.0" encoding="utf-8"?>
+<p:sld xmlns:a="http://schemas.openxmlformats.org/drawingml/2006/main" xmlns:r="http://schemas.openxmlformats.org/officeDocument/2006/relationships" xmlns:p="http://schemas.openxmlformats.org/presentationml/2006/main">
+  <p:cSld>
+    <p:spTree>
+      <p:nvGrpSpPr>
+        <p:cNvPr id="1" name=""/>
+        <p:cNvGrpSpPr/>
+        <p:nvPr/>
+      </p:nvGrpSpPr>
+      <p:grpSpPr>
+        <a:xfrm>
+          <a:off x="0" y="0"/>
+          <a:ext cx="0" cy="0"/>
+          <a:chOff x="0" y="0"/>
+          <a:chExt cx="0" cy="0"/>
+        </a:xfrm>
+      </p:grpSpPr>
+      <p:sp>
+        <p:nvSpPr>
+          <p:cNvPr id="2" name="Title 1">
+            <a:extLst>
+              <a:ext uri="{FF2B5EF4-FFF2-40B4-BE49-F238E27FC236}">
+                <a16:creationId xmlns:a16="http://schemas.microsoft.com/office/drawing/2014/main" id="{E9DC4291-DDF9-42DB-AFB1-278BEA96BAD7}"/>
+              </a:ext>
+            </a:extLst>
+          </p:cNvPr>
+          <p:cNvSpPr>
+            <a:spLocks noGrp="1"/>
+          </p:cNvSpPr>
+          <p:nvPr>
+            <p:ph type="title"/>
+          </p:nvPr>
+        </p:nvSpPr>
+        <p:spPr/>
+        <p:txBody>
+          <a:bodyPr/>
+          <a:lstStyle/>
+          <a:p>
+            <a:endParaRPr lang="en-GB" dirty="0"/>
+          </a:p>
+        </p:txBody>
+      </p:sp>
+      <p:sp>
+        <p:nvSpPr>
+          <p:cNvPr id="3" name="Content Placeholder 2">
+            <a:extLst>
+              <a:ext uri="{FF2B5EF4-FFF2-40B4-BE49-F238E27FC236}">
+                <a16:creationId xmlns:a16="http://schemas.microsoft.com/office/drawing/2014/main" id="{33A4D2EE-A201-40F4-A497-0AE6F95A140D}"/>
+              </a:ext>
+            </a:extLst>
+          </p:cNvPr>
+          <p:cNvSpPr>
+            <a:spLocks noGrp="1"/>
+          </p:cNvSpPr>
+          <p:nvPr>
+            <p:ph idx="1"/>
+          </p:nvPr>
+        </p:nvSpPr>
+        <p:spPr/>
+        <p:txBody>
+          <a:bodyPr/>
+          <a:lstStyle/>
+          <a:p>
+            <a:endParaRPr lang="en-GB"/>
+          </a:p>
+        </p:txBody>
+      </p:sp>
+    </p:spTree>
+    <p:extLst>
+      <p:ext uri="{BB962C8B-B14F-4D97-AF65-F5344CB8AC3E}">
+        <p14:creationId xmlns:p14="http://schemas.microsoft.com/office/powerpoint/2010/main" val="3833891622"/>
+      </p:ext>
+    </p:extLst>
+  </p:cSld>
+  <p:clrMapOvr>
+    <a:masterClrMapping/>
+  </p:clrMapOvr>
+</p:sld>
+</file>
+
+<file path=ppt/slides/slide4.xml><?xml version="1.0" encoding="utf-8"?>
+<p:sld xmlns:a="http://schemas.openxmlformats.org/drawingml/2006/main" xmlns:r="http://schemas.openxmlformats.org/officeDocument/2006/relationships" xmlns:p="http://schemas.openxmlformats.org/presentationml/2006/main">
+  <p:cSld>
+    <p:spTree>
+      <p:nvGrpSpPr>
+        <p:cNvPr id="1" name=""/>
+        <p:cNvGrpSpPr/>
+        <p:nvPr/>
+      </p:nvGrpSpPr>
+      <p:grpSpPr>
+        <a:xfrm>
+          <a:off x="0" y="0"/>
+          <a:ext cx="0" cy="0"/>
+          <a:chOff x="0" y="0"/>
+          <a:chExt cx="0" cy="0"/>
+        </a:xfrm>
+      </p:grpSpPr>
+      <p:sp>
+        <p:nvSpPr>
+          <p:cNvPr id="2" name="Title 1">
+            <a:extLst>
+              <a:ext uri="{FF2B5EF4-FFF2-40B4-BE49-F238E27FC236}">
+                <a16:creationId xmlns:a16="http://schemas.microsoft.com/office/drawing/2014/main" id="{5E06A31E-AB9B-4BC8-B565-3360E1567544}"/>
+              </a:ext>
+            </a:extLst>
+          </p:cNvPr>
+          <p:cNvSpPr>
+            <a:spLocks noGrp="1"/>
+          </p:cNvSpPr>
+          <p:nvPr>
+            <p:ph type="title"/>
+          </p:nvPr>
+        </p:nvSpPr>
+        <p:spPr/>
+        <p:txBody>
+          <a:bodyPr/>
+          <a:lstStyle/>
+          <a:p>
+            <a:r>
+              <a:rPr lang="en-GB" dirty="0"/>
+              <a:t>Data</a:t>
+            </a:r>
+          </a:p>
+        </p:txBody>
+      </p:sp>
+      <p:sp>
+        <p:nvSpPr>
+          <p:cNvPr id="3" name="Content Placeholder 2">
+            <a:extLst>
+              <a:ext uri="{FF2B5EF4-FFF2-40B4-BE49-F238E27FC236}">
+                <a16:creationId xmlns:a16="http://schemas.microsoft.com/office/drawing/2014/main" id="{E1D93C90-C367-4D1C-8B22-4029534D7B19}"/>
+              </a:ext>
+            </a:extLst>
+          </p:cNvPr>
+          <p:cNvSpPr>
+            <a:spLocks noGrp="1"/>
+          </p:cNvSpPr>
+          <p:nvPr>
+            <p:ph idx="1"/>
+          </p:nvPr>
+        </p:nvSpPr>
+        <p:spPr>
+          <a:xfrm>
+            <a:off x="838200" y="1690688"/>
+            <a:ext cx="10515600" cy="4427393"/>
+          </a:xfrm>
+        </p:spPr>
+        <p:txBody>
+          <a:bodyPr>
+            <a:normAutofit/>
+          </a:bodyPr>
+          <a:lstStyle/>
+          <a:p>
+            <a:pPr lvl="0"/>
+            <a:r>
+              <a:rPr lang="en-US" dirty="0"/>
+              <a:t>Training and benchmark set with 20758 and 8809 proteins respectively </a:t>
+            </a:r>
+          </a:p>
+          <a:p>
+            <a:pPr lvl="0"/>
+            <a:r>
+              <a:rPr lang="en-US" dirty="0"/>
+              <a:t>Non-signal peptides Symbol: </a:t>
+            </a:r>
+            <a:r>
+              <a:rPr lang="en-US" sz="3200" b="1" dirty="0"/>
+              <a:t>0</a:t>
+            </a:r>
+            <a:endParaRPr lang="en-US" b="1" dirty="0"/>
+          </a:p>
+          <a:p>
+            <a:pPr lvl="0"/>
+            <a:r>
+              <a:rPr lang="en-US" dirty="0"/>
+              <a:t>Sec/SPI: “</a:t>
+            </a:r>
+            <a:r>
+              <a:rPr lang="en-US" sz="3200" b="1" dirty="0"/>
+              <a:t>S</a:t>
+            </a:r>
+            <a:r>
+              <a:rPr lang="en-US" dirty="0"/>
+              <a:t>tandard" secretory signal peptides, exclusive to eukaryotes Symbol: S</a:t>
+            </a:r>
+            <a:endParaRPr lang="en-GB" dirty="0"/>
+          </a:p>
+          <a:p>
+            <a:pPr lvl="0"/>
+            <a:r>
+              <a:rPr lang="en-US" dirty="0"/>
+              <a:t>Sec/SPII: </a:t>
+            </a:r>
+            <a:r>
+              <a:rPr lang="en-US" sz="3200" b="1" dirty="0"/>
+              <a:t>L</a:t>
+            </a:r>
+            <a:r>
+              <a:rPr lang="en-US" dirty="0"/>
+              <a:t>ipoprotein signal peptides Symbol: L</a:t>
+            </a:r>
+          </a:p>
+          <a:p>
+            <a:pPr lvl="0"/>
+            <a:r>
+              <a:rPr lang="en-US" dirty="0"/>
+              <a:t>Tat/SPI: </a:t>
+            </a:r>
+            <a:r>
+              <a:rPr lang="en-US" sz="3200" b="1" dirty="0"/>
+              <a:t>T</a:t>
+            </a:r>
+            <a:r>
+              <a:rPr lang="en-US" dirty="0"/>
+              <a:t>at signal peptides Symbol: T</a:t>
+            </a:r>
+            <a:endParaRPr lang="en-GB" dirty="0"/>
+          </a:p>
+        </p:txBody>
+      </p:sp>
+    </p:spTree>
+    <p:extLst>
+      <p:ext uri="{BB962C8B-B14F-4D97-AF65-F5344CB8AC3E}">
+        <p14:creationId xmlns:p14="http://schemas.microsoft.com/office/powerpoint/2010/main" val="4090732556"/>
+      </p:ext>
+    </p:extLst>
+  </p:cSld>
+  <p:clrMapOvr>
+    <a:masterClrMapping/>
+  </p:clrMapOvr>
+</p:sld>
+</file>
+
+<file path=ppt/slides/slide5.xml><?xml version="1.0" encoding="utf-8"?>
+<p:sld xmlns:a="http://schemas.openxmlformats.org/drawingml/2006/main" xmlns:r="http://schemas.openxmlformats.org/officeDocument/2006/relationships" xmlns:p="http://schemas.openxmlformats.org/presentationml/2006/main">
+  <p:cSld>
+    <p:spTree>
+      <p:nvGrpSpPr>
+        <p:cNvPr id="1" name=""/>
+        <p:cNvGrpSpPr/>
+        <p:nvPr/>
+      </p:nvGrpSpPr>
+      <p:grpSpPr>
+        <a:xfrm>
+          <a:off x="0" y="0"/>
+          <a:ext cx="0" cy="0"/>
+          <a:chOff x="0" y="0"/>
+          <a:chExt cx="0" cy="0"/>
+        </a:xfrm>
+      </p:grpSpPr>
+      <p:sp>
+        <p:nvSpPr>
+          <p:cNvPr id="2" name="Title 1">
+            <a:extLst>
+              <a:ext uri="{FF2B5EF4-FFF2-40B4-BE49-F238E27FC236}">
+                <a16:creationId xmlns:a16="http://schemas.microsoft.com/office/drawing/2014/main" id="{3A24AC16-3DC8-4352-B3DB-EED2414847FB}"/>
+              </a:ext>
+            </a:extLst>
+          </p:cNvPr>
+          <p:cNvSpPr>
+            <a:spLocks noGrp="1"/>
+          </p:cNvSpPr>
+          <p:nvPr>
+            <p:ph type="title"/>
+          </p:nvPr>
+        </p:nvSpPr>
+        <p:spPr/>
+        <p:txBody>
+          <a:bodyPr/>
+          <a:lstStyle/>
+          <a:p>
+            <a:r>
+              <a:rPr lang="en-GB" dirty="0"/>
+              <a:t>Class imbalance</a:t>
+            </a:r>
+          </a:p>
+        </p:txBody>
+      </p:sp>
+      <p:sp>
+        <p:nvSpPr>
+          <p:cNvPr id="3" name="Content Placeholder 2">
+            <a:extLst>
+              <a:ext uri="{FF2B5EF4-FFF2-40B4-BE49-F238E27FC236}">
+                <a16:creationId xmlns:a16="http://schemas.microsoft.com/office/drawing/2014/main" id="{3A3E49A9-F161-4318-A14B-89944EA5A49C}"/>
+              </a:ext>
+            </a:extLst>
+          </p:cNvPr>
+          <p:cNvSpPr>
+            <a:spLocks noGrp="1"/>
+          </p:cNvSpPr>
+          <p:nvPr>
+            <p:ph idx="1"/>
+          </p:nvPr>
+        </p:nvSpPr>
+        <p:spPr/>
+        <p:txBody>
+          <a:bodyPr/>
+          <a:lstStyle/>
+          <a:p>
+            <a:r>
+              <a:rPr lang="en-GB" dirty="0"/>
+              <a:t> 0: 0.913</a:t>
+            </a:r>
+          </a:p>
+          <a:p>
+            <a:r>
+              <a:rPr lang="en-GB" dirty="0"/>
+              <a:t> S: 0.054</a:t>
+            </a:r>
+          </a:p>
+          <a:p>
+            <a:r>
+              <a:rPr lang="en-GB" dirty="0"/>
+              <a:t> T: 0.011</a:t>
+            </a:r>
+          </a:p>
+          <a:p>
+            <a:r>
+              <a:rPr lang="en-GB" dirty="0"/>
+              <a:t> L: 0.022</a:t>
+            </a:r>
+          </a:p>
+          <a:p>
+            <a:pPr marL="0" indent="0">
+              <a:buNone/>
+            </a:pPr>
+            <a:r>
+              <a:rPr lang="en-GB" dirty="0">
+                <a:sym typeface="Wingdings" panose="05000000000000000000" pitchFamily="2" charset="2"/>
+              </a:rPr>
+              <a:t> Class weighting </a:t>
+            </a:r>
+            <a:endParaRPr lang="en-GB" dirty="0"/>
+          </a:p>
+        </p:txBody>
+      </p:sp>
+    </p:spTree>
+    <p:extLst>
+      <p:ext uri="{BB962C8B-B14F-4D97-AF65-F5344CB8AC3E}">
+        <p14:creationId xmlns:p14="http://schemas.microsoft.com/office/powerpoint/2010/main" val="38212677"/>
+      </p:ext>
+    </p:extLst>
+  </p:cSld>
+  <p:clrMapOvr>
+    <a:masterClrMapping/>
+  </p:clrMapOvr>
+</p:sld>
+</file>
+
+<file path=ppt/slides/slide6.xml><?xml version="1.0" encoding="utf-8"?>
+<p:sld xmlns:a="http://schemas.openxmlformats.org/drawingml/2006/main" xmlns:r="http://schemas.openxmlformats.org/officeDocument/2006/relationships" xmlns:p="http://schemas.openxmlformats.org/presentationml/2006/main">
+  <p:cSld>
+    <p:spTree>
+      <p:nvGrpSpPr>
+        <p:cNvPr id="1" name=""/>
+        <p:cNvGrpSpPr/>
+        <p:nvPr/>
+      </p:nvGrpSpPr>
+      <p:grpSpPr>
+        <a:xfrm>
+          <a:off x="0" y="0"/>
+          <a:ext cx="0" cy="0"/>
+          <a:chOff x="0" y="0"/>
+          <a:chExt cx="0" cy="0"/>
+        </a:xfrm>
+      </p:grpSpPr>
+      <p:sp>
+        <p:nvSpPr>
+          <p:cNvPr id="2" name="Title 1">
+            <a:extLst>
+              <a:ext uri="{FF2B5EF4-FFF2-40B4-BE49-F238E27FC236}">
+                <a16:creationId xmlns:a16="http://schemas.microsoft.com/office/drawing/2014/main" id="{3CC9AF03-1C56-4DEE-A2B2-6037BB073B39}"/>
+              </a:ext>
+            </a:extLst>
+          </p:cNvPr>
+          <p:cNvSpPr>
+            <a:spLocks noGrp="1"/>
+          </p:cNvSpPr>
+          <p:nvPr>
+            <p:ph type="title"/>
+          </p:nvPr>
+        </p:nvSpPr>
+        <p:spPr/>
+        <p:txBody>
+          <a:bodyPr/>
+          <a:lstStyle/>
+          <a:p>
+            <a:r>
+              <a:rPr lang="en-GB" dirty="0"/>
+              <a:t>Application of </a:t>
+            </a:r>
+            <a:r>
+              <a:rPr lang="en-GB" dirty="0" err="1"/>
+              <a:t>SecVec</a:t>
+            </a:r>
+            <a:r>
+              <a:rPr lang="en-GB" dirty="0"/>
+              <a:t> on the data</a:t>
+            </a:r>
+          </a:p>
+        </p:txBody>
+      </p:sp>
+      <p:sp>
+        <p:nvSpPr>
+          <p:cNvPr id="3" name="Content Placeholder 2">
+            <a:extLst>
+              <a:ext uri="{FF2B5EF4-FFF2-40B4-BE49-F238E27FC236}">
+                <a16:creationId xmlns:a16="http://schemas.microsoft.com/office/drawing/2014/main" id="{6B7888A4-A2B2-4C3B-BF82-B4E608350481}"/>
+              </a:ext>
+            </a:extLst>
+          </p:cNvPr>
+          <p:cNvSpPr>
+            <a:spLocks noGrp="1"/>
+          </p:cNvSpPr>
+          <p:nvPr>
+            <p:ph idx="1"/>
+          </p:nvPr>
+        </p:nvSpPr>
+        <p:spPr/>
+        <p:txBody>
+          <a:bodyPr/>
+          <a:lstStyle/>
+          <a:p>
+            <a:pPr marL="514350" indent="-514350">
+              <a:buFont typeface="+mj-lt"/>
+              <a:buAutoNum type="arabicPeriod"/>
+            </a:pPr>
+            <a:r>
+              <a:rPr lang="en-GB" dirty="0"/>
+              <a:t>All proteins in the training and benchmark are processed with the latest </a:t>
+            </a:r>
+            <a:r>
+              <a:rPr lang="en-GB" dirty="0" err="1"/>
+              <a:t>SecVec</a:t>
+            </a:r>
+            <a:r>
+              <a:rPr lang="en-GB" dirty="0"/>
+              <a:t> model: Output = Vector: (1024*protein length) for every protein</a:t>
+            </a:r>
+          </a:p>
+          <a:p>
+            <a:pPr marL="514350" indent="-514350">
+              <a:buFont typeface="+mj-lt"/>
+              <a:buAutoNum type="arabicPeriod"/>
+            </a:pPr>
+            <a:r>
+              <a:rPr lang="en-GB" dirty="0"/>
+              <a:t>Transformation of the output so that the embeddings of every protein are of length 70 </a:t>
+            </a:r>
+          </a:p>
+          <a:p>
+            <a:pPr marL="514350" indent="-514350">
+              <a:buFont typeface="+mj-lt"/>
+              <a:buAutoNum type="arabicPeriod"/>
+            </a:pPr>
+            <a:r>
+              <a:rPr lang="en-GB" dirty="0"/>
+              <a:t>Training and benchmark on the results</a:t>
+            </a:r>
+          </a:p>
+        </p:txBody>
+      </p:sp>
+    </p:spTree>
+    <p:extLst>
+      <p:ext uri="{BB962C8B-B14F-4D97-AF65-F5344CB8AC3E}">
+        <p14:creationId xmlns:p14="http://schemas.microsoft.com/office/powerpoint/2010/main" val="1597534586"/>
+      </p:ext>
+    </p:extLst>
+  </p:cSld>
+  <p:clrMapOvr>
+    <a:masterClrMapping/>
+  </p:clrMapOvr>
+</p:sld>
+</file>
+
+<file path=ppt/slides/slide7.xml><?xml version="1.0" encoding="utf-8"?>
+<p:sld xmlns:a="http://schemas.openxmlformats.org/drawingml/2006/main" xmlns:r="http://schemas.openxmlformats.org/officeDocument/2006/relationships" xmlns:p="http://schemas.openxmlformats.org/presentationml/2006/main">
+  <p:cSld>
+    <p:bg>
+      <p:bgPr>
+        <a:solidFill>
+          <a:schemeClr val="bg1"/>
+        </a:solidFill>
+        <a:effectLst/>
+      </p:bgPr>
+    </p:bg>
+    <p:spTree>
+      <p:nvGrpSpPr>
+        <p:cNvPr id="1" name=""/>
+        <p:cNvGrpSpPr/>
+        <p:nvPr/>
+      </p:nvGrpSpPr>
+      <p:grpSpPr>
+        <a:xfrm>
+          <a:off x="0" y="0"/>
+          <a:ext cx="0" cy="0"/>
+          <a:chOff x="0" y="0"/>
+          <a:chExt cx="0" cy="0"/>
+        </a:xfrm>
+      </p:grpSpPr>
+      <p:sp>
+        <p:nvSpPr>
+          <p:cNvPr id="8" name="Title 1">
+            <a:extLst>
+              <a:ext uri="{FF2B5EF4-FFF2-40B4-BE49-F238E27FC236}">
+                <a16:creationId xmlns:a16="http://schemas.microsoft.com/office/drawing/2014/main" id="{03AFF5D1-5D25-4DB8-B794-22329BEBF148}"/>
+              </a:ext>
+            </a:extLst>
+          </p:cNvPr>
+          <p:cNvSpPr>
+            <a:spLocks noGrp="1"/>
+          </p:cNvSpPr>
+          <p:nvPr>
+            <p:ph type="title"/>
+          </p:nvPr>
+        </p:nvSpPr>
+        <p:spPr>
+          <a:xfrm>
+            <a:off x="838200" y="411480"/>
+            <a:ext cx="10515600" cy="1325563"/>
+          </a:xfrm>
+        </p:spPr>
+        <p:txBody>
+          <a:bodyPr>
+            <a:normAutofit/>
+          </a:bodyPr>
+          <a:lstStyle/>
+          <a:p>
+            <a:r>
+              <a:rPr lang="en-GB" sz="4000" dirty="0"/>
+              <a:t>Model configuration</a:t>
+            </a:r>
+          </a:p>
+        </p:txBody>
+      </p:sp>
+      <p:sp>
+        <p:nvSpPr>
+          <p:cNvPr id="11" name="Content Placeholder 10">
+            <a:extLst>
+              <a:ext uri="{FF2B5EF4-FFF2-40B4-BE49-F238E27FC236}">
+                <a16:creationId xmlns:a16="http://schemas.microsoft.com/office/drawing/2014/main" id="{B189025D-132B-48FD-A3E6-AA46E34AD8BD}"/>
+              </a:ext>
+            </a:extLst>
+          </p:cNvPr>
+          <p:cNvSpPr>
+            <a:spLocks noGrp="1"/>
+          </p:cNvSpPr>
+          <p:nvPr>
+            <p:ph idx="1"/>
+          </p:nvPr>
+        </p:nvSpPr>
+        <p:spPr>
+          <a:xfrm>
+            <a:off x="838200" y="1737043"/>
+            <a:ext cx="4670742" cy="4469075"/>
+          </a:xfrm>
+        </p:spPr>
+        <p:txBody>
+          <a:bodyPr/>
+          <a:lstStyle/>
+          <a:p>
+            <a:r>
+              <a:rPr lang="en-GB" dirty="0"/>
+              <a:t>Learning rate = 0.03</a:t>
+            </a:r>
+          </a:p>
+          <a:p>
+            <a:r>
+              <a:rPr lang="en-GB" dirty="0"/>
+              <a:t>Batch size  = 128</a:t>
+            </a:r>
+          </a:p>
+          <a:p>
+            <a:r>
+              <a:rPr lang="en-GB" dirty="0"/>
+              <a:t>Dropout and batch-normalization</a:t>
+            </a:r>
+          </a:p>
+          <a:p>
+            <a:r>
+              <a:rPr lang="en-GB" dirty="0"/>
+              <a:t>Class weights (1/</a:t>
+            </a:r>
+            <a:r>
+              <a:rPr lang="en-GB" dirty="0" err="1"/>
+              <a:t>N</a:t>
+            </a:r>
+            <a:r>
+              <a:rPr lang="en-GB" baseline="-25000" dirty="0" err="1"/>
+              <a:t>class</a:t>
+            </a:r>
+            <a:r>
+              <a:rPr lang="en-GB" dirty="0"/>
+              <a:t>)</a:t>
+            </a:r>
+          </a:p>
+          <a:p>
+            <a:r>
+              <a:rPr lang="en-GB" dirty="0"/>
+              <a:t>Conditional random field</a:t>
+            </a:r>
+          </a:p>
+        </p:txBody>
+      </p:sp>
+      <p:pic>
+        <p:nvPicPr>
+          <p:cNvPr id="13" name="Graphic 12">
+            <a:extLst>
+              <a:ext uri="{FF2B5EF4-FFF2-40B4-BE49-F238E27FC236}">
+                <a16:creationId xmlns:a16="http://schemas.microsoft.com/office/drawing/2014/main" id="{B9DFDDED-F350-46E5-BE60-24A8A1162821}"/>
+              </a:ext>
+            </a:extLst>
+          </p:cNvPr>
+          <p:cNvPicPr>
+            <a:picLocks noChangeAspect="1"/>
+          </p:cNvPicPr>
+          <p:nvPr/>
+        </p:nvPicPr>
+        <p:blipFill>
+          <a:blip r:embed="rId2">
+            <a:extLst>
+              <a:ext uri="{96DAC541-7B7A-43D3-8B79-37D633B846F1}">
+                <asvg:svgBlip xmlns:asvg="http://schemas.microsoft.com/office/drawing/2016/SVG/main" r:embed="rId3"/>
+              </a:ext>
+            </a:extLst>
+          </a:blip>
+          <a:stretch>
+            <a:fillRect/>
+          </a:stretch>
+        </p:blipFill>
+        <p:spPr>
+          <a:xfrm>
+            <a:off x="5508942" y="129314"/>
+            <a:ext cx="6669615" cy="6599372"/>
+          </a:xfrm>
+          <a:prstGeom prst="rect">
+            <a:avLst/>
+          </a:prstGeom>
+        </p:spPr>
+      </p:pic>
+    </p:spTree>
+    <p:extLst>
+      <p:ext uri="{BB962C8B-B14F-4D97-AF65-F5344CB8AC3E}">
+        <p14:creationId xmlns:p14="http://schemas.microsoft.com/office/powerpoint/2010/main" val="1181154332"/>
+      </p:ext>
+    </p:extLst>
+  </p:cSld>
+  <p:clrMapOvr>
+    <a:masterClrMapping/>
+  </p:clrMapOvr>
+</p:sld>
+</file>
+
+<file path=ppt/slides/slide8.xml><?xml version="1.0" encoding="utf-8"?>
+<p:sld xmlns:a="http://schemas.openxmlformats.org/drawingml/2006/main" xmlns:r="http://schemas.openxmlformats.org/officeDocument/2006/relationships" xmlns:p="http://schemas.openxmlformats.org/presentationml/2006/main">
+  <p:cSld>
+    <p:spTree>
+      <p:nvGrpSpPr>
+        <p:cNvPr id="1" name=""/>
+        <p:cNvGrpSpPr/>
+        <p:nvPr/>
+      </p:nvGrpSpPr>
+      <p:grpSpPr>
+        <a:xfrm>
+          <a:off x="0" y="0"/>
+          <a:ext cx="0" cy="0"/>
+          <a:chOff x="0" y="0"/>
+          <a:chExt cx="0" cy="0"/>
+        </a:xfrm>
+      </p:grpSpPr>
+      <p:sp>
+        <p:nvSpPr>
+          <p:cNvPr id="2" name="Title 1">
+            <a:extLst>
+              <a:ext uri="{FF2B5EF4-FFF2-40B4-BE49-F238E27FC236}">
+                <a16:creationId xmlns:a16="http://schemas.microsoft.com/office/drawing/2014/main" id="{B2142368-5CD9-46AD-A1E8-F3DCAAF3D952}"/>
+              </a:ext>
+            </a:extLst>
+          </p:cNvPr>
+          <p:cNvSpPr>
+            <a:spLocks noGrp="1"/>
+          </p:cNvSpPr>
+          <p:nvPr>
+            <p:ph type="title"/>
+          </p:nvPr>
+        </p:nvSpPr>
+        <p:spPr/>
+        <p:txBody>
+          <a:bodyPr/>
+          <a:lstStyle/>
+          <a:p>
+            <a:r>
+              <a:rPr lang="en-GB" dirty="0"/>
+              <a:t>Results</a:t>
+            </a:r>
+          </a:p>
+        </p:txBody>
+      </p:sp>
+      <p:sp>
+        <p:nvSpPr>
+          <p:cNvPr id="3" name="Content Placeholder 2">
+            <a:extLst>
+              <a:ext uri="{FF2B5EF4-FFF2-40B4-BE49-F238E27FC236}">
+                <a16:creationId xmlns:a16="http://schemas.microsoft.com/office/drawing/2014/main" id="{FB287C32-B2B7-4780-A7AA-1109FF812013}"/>
+              </a:ext>
+            </a:extLst>
+          </p:cNvPr>
+          <p:cNvSpPr>
+            <a:spLocks noGrp="1"/>
+          </p:cNvSpPr>
+          <p:nvPr>
+            <p:ph idx="1"/>
+          </p:nvPr>
+        </p:nvSpPr>
+        <p:spPr/>
+        <p:txBody>
+          <a:bodyPr/>
+          <a:lstStyle/>
+          <a:p>
+            <a:r>
+              <a:rPr lang="en-GB" dirty="0"/>
+              <a:t>Q4 = </a:t>
+            </a:r>
+          </a:p>
+        </p:txBody>
+      </p:sp>
+    </p:spTree>
+    <p:extLst>
+      <p:ext uri="{BB962C8B-B14F-4D97-AF65-F5344CB8AC3E}">
+        <p14:creationId xmlns:p14="http://schemas.microsoft.com/office/powerpoint/2010/main" val="994133551"/>
+      </p:ext>
+    </p:extLst>
+  </p:cSld>
+  <p:clrMapOvr>
+    <a:masterClrMapping/>
+  </p:clrMapOvr>
+</p:sld>
+</file>
+
+<file path=ppt/slides/slide9.xml><?xml version="1.0" encoding="utf-8"?>
+<p:sld xmlns:a="http://schemas.openxmlformats.org/drawingml/2006/main" xmlns:r="http://schemas.openxmlformats.org/officeDocument/2006/relationships" xmlns:p="http://schemas.openxmlformats.org/presentationml/2006/main">
+  <p:cSld>
+    <p:spTree>
+      <p:nvGrpSpPr>
+        <p:cNvPr id="1" name=""/>
+        <p:cNvGrpSpPr/>
+        <p:nvPr/>
+      </p:nvGrpSpPr>
+      <p:grpSpPr>
+        <a:xfrm>
+          <a:off x="0" y="0"/>
+          <a:ext cx="0" cy="0"/>
+          <a:chOff x="0" y="0"/>
+          <a:chExt cx="0" cy="0"/>
+        </a:xfrm>
+      </p:grpSpPr>
+      <p:pic>
+        <p:nvPicPr>
+          <p:cNvPr id="9" name="Content Placeholder 8">
+            <a:extLst>
+              <a:ext uri="{FF2B5EF4-FFF2-40B4-BE49-F238E27FC236}">
+                <a16:creationId xmlns:a16="http://schemas.microsoft.com/office/drawing/2014/main" id="{BD2CABBD-0374-443B-A49D-1A552342F4CC}"/>
+              </a:ext>
+            </a:extLst>
+          </p:cNvPr>
+          <p:cNvPicPr>
+            <a:picLocks noGrp="1" noChangeAspect="1"/>
+          </p:cNvPicPr>
+          <p:nvPr>
+            <p:ph idx="1"/>
+          </p:nvPr>
+        </p:nvPicPr>
+        <p:blipFill>
+          <a:blip r:embed="rId2">
+            <a:extLst>
+              <a:ext uri="{28A0092B-C50C-407E-A947-70E740481C1C}">
+                <a14:useLocalDpi xmlns:a14="http://schemas.microsoft.com/office/drawing/2010/main" val="0"/>
+              </a:ext>
+            </a:extLst>
+          </a:blip>
+          <a:stretch>
+            <a:fillRect/>
+          </a:stretch>
+        </p:blipFill>
+        <p:spPr>
+          <a:xfrm>
+            <a:off x="197063" y="1690688"/>
+            <a:ext cx="6195373" cy="4130249"/>
+          </a:xfrm>
+        </p:spPr>
+      </p:pic>
+      <p:sp>
+        <p:nvSpPr>
+          <p:cNvPr id="7" name="Title 1">
+            <a:extLst>
+              <a:ext uri="{FF2B5EF4-FFF2-40B4-BE49-F238E27FC236}">
+                <a16:creationId xmlns:a16="http://schemas.microsoft.com/office/drawing/2014/main" id="{53B0E661-EFEB-4B87-9709-69EEA27CE22B}"/>
+              </a:ext>
+            </a:extLst>
+          </p:cNvPr>
+          <p:cNvSpPr>
+            <a:spLocks noGrp="1"/>
+          </p:cNvSpPr>
+          <p:nvPr>
+            <p:ph type="title"/>
+          </p:nvPr>
+        </p:nvSpPr>
+        <p:spPr>
+          <a:xfrm>
+            <a:off x="838200" y="365125"/>
+            <a:ext cx="10515600" cy="1325563"/>
+          </a:xfrm>
+        </p:spPr>
+        <p:txBody>
+          <a:bodyPr/>
+          <a:lstStyle/>
+          <a:p>
+            <a:r>
+              <a:rPr lang="en-GB" dirty="0"/>
+              <a:t>Results without and with a CRF: residual MCC</a:t>
+            </a:r>
+          </a:p>
+        </p:txBody>
+      </p:sp>
+      <p:pic>
+        <p:nvPicPr>
+          <p:cNvPr id="11" name="Picture 10">
+            <a:extLst>
+              <a:ext uri="{FF2B5EF4-FFF2-40B4-BE49-F238E27FC236}">
+                <a16:creationId xmlns:a16="http://schemas.microsoft.com/office/drawing/2014/main" id="{4FB827BE-A775-4DF5-875D-D8D32D5660F3}"/>
+              </a:ext>
+            </a:extLst>
+          </p:cNvPr>
+          <p:cNvPicPr>
+            <a:picLocks noChangeAspect="1"/>
+          </p:cNvPicPr>
+          <p:nvPr/>
+        </p:nvPicPr>
+        <p:blipFill>
+          <a:blip r:embed="rId3">
+            <a:extLst>
+              <a:ext uri="{28A0092B-C50C-407E-A947-70E740481C1C}">
+                <a14:useLocalDpi xmlns:a14="http://schemas.microsoft.com/office/drawing/2010/main" val="0"/>
+              </a:ext>
+            </a:extLst>
+          </a:blip>
+          <a:stretch>
+            <a:fillRect/>
+          </a:stretch>
+        </p:blipFill>
+        <p:spPr>
+          <a:xfrm>
+            <a:off x="5996628" y="1690689"/>
+            <a:ext cx="6195372" cy="4130248"/>
+          </a:xfrm>
+          <a:prstGeom prst="rect">
+            <a:avLst/>
+          </a:prstGeom>
+        </p:spPr>
+      </p:pic>
+    </p:spTree>
+    <p:extLst>
+      <p:ext uri="{BB962C8B-B14F-4D97-AF65-F5344CB8AC3E}">
+        <p14:creationId xmlns:p14="http://schemas.microsoft.com/office/powerpoint/2010/main" val="2457364123"/>
       </p:ext>
     </p:extLst>
   </p:cSld>
@@ -3785,4 +5520,299 @@
     </a:ext>
   </a:extLst>
 </a:theme>
+</file>
+
+<file path=ppt/theme/theme2.xml><?xml version="1.0" encoding="utf-8"?>
+<a:theme xmlns:a="http://schemas.openxmlformats.org/drawingml/2006/main" name="Office Theme">
+  <a:themeElements>
+    <a:clrScheme name="Office">
+      <a:dk1>
+        <a:sysClr val="windowText" lastClr="000000"/>
+      </a:dk1>
+      <a:lt1>
+        <a:sysClr val="window" lastClr="FFFFFF"/>
+      </a:lt1>
+      <a:dk2>
+        <a:srgbClr val="44546A"/>
+      </a:dk2>
+      <a:lt2>
+        <a:srgbClr val="E7E6E6"/>
+      </a:lt2>
+      <a:accent1>
+        <a:srgbClr val="4472C4"/>
+      </a:accent1>
+      <a:accent2>
+        <a:srgbClr val="ED7D31"/>
+      </a:accent2>
+      <a:accent3>
+        <a:srgbClr val="A5A5A5"/>
+      </a:accent3>
+      <a:accent4>
+        <a:srgbClr val="FFC000"/>
+      </a:accent4>
+      <a:accent5>
+        <a:srgbClr val="5B9BD5"/>
+      </a:accent5>
+      <a:accent6>
+        <a:srgbClr val="70AD47"/>
+      </a:accent6>
+      <a:hlink>
+        <a:srgbClr val="0563C1"/>
+      </a:hlink>
+      <a:folHlink>
+        <a:srgbClr val="954F72"/>
+      </a:folHlink>
+    </a:clrScheme>
+    <a:fontScheme name="Office">
+      <a:majorFont>
+        <a:latin typeface="Calibri Light" panose="020F0302020204030204"/>
+        <a:ea typeface=""/>
+        <a:cs typeface=""/>
+        <a:font script="Jpan" typeface="游ゴシック Light"/>
+        <a:font script="Hang" typeface="맑은 고딕"/>
+        <a:font script="Hans" typeface="等线 Light"/>
+        <a:font script="Hant" typeface="新細明體"/>
+        <a:font script="Arab" typeface="Times New Roman"/>
+        <a:font script="Hebr" typeface="Times New Roman"/>
+        <a:font script="Thai" typeface="Angsana New"/>
+        <a:font script="Ethi" typeface="Nyala"/>
+        <a:font script="Beng" typeface="Vrinda"/>
+        <a:font script="Gujr" typeface="Shruti"/>
+        <a:font script="Khmr" typeface="MoolBoran"/>
+        <a:font script="Knda" typeface="Tunga"/>
+        <a:font script="Guru" typeface="Raavi"/>
+        <a:font script="Cans" typeface="Euphemia"/>
+        <a:font script="Cher" typeface="Plantagenet Cherokee"/>
+        <a:font script="Yiii" typeface="Microsoft Yi Baiti"/>
+        <a:font script="Tibt" typeface="Microsoft Himalaya"/>
+        <a:font script="Thaa" typeface="MV Boli"/>
+        <a:font script="Deva" typeface="Mangal"/>
+        <a:font script="Telu" typeface="Gautami"/>
+        <a:font script="Taml" typeface="Latha"/>
+        <a:font script="Syrc" typeface="Estrangelo Edessa"/>
+        <a:font script="Orya" typeface="Kalinga"/>
+        <a:font script="Mlym" typeface="Kartika"/>
+        <a:font script="Laoo" typeface="DokChampa"/>
+        <a:font script="Sinh" typeface="Iskoola Pota"/>
+        <a:font script="Mong" typeface="Mongolian Baiti"/>
+        <a:font script="Viet" typeface="Times New Roman"/>
+        <a:font script="Uigh" typeface="Microsoft Uighur"/>
+        <a:font script="Geor" typeface="Sylfaen"/>
+        <a:font script="Armn" typeface="Arial"/>
+        <a:font script="Bugi" typeface="Leelawadee UI"/>
+        <a:font script="Bopo" typeface="Microsoft JhengHei"/>
+        <a:font script="Java" typeface="Javanese Text"/>
+        <a:font script="Lisu" typeface="Segoe UI"/>
+        <a:font script="Mymr" typeface="Myanmar Text"/>
+        <a:font script="Nkoo" typeface="Ebrima"/>
+        <a:font script="Olck" typeface="Nirmala UI"/>
+        <a:font script="Osma" typeface="Ebrima"/>
+        <a:font script="Phag" typeface="Phagspa"/>
+        <a:font script="Syrn" typeface="Estrangelo Edessa"/>
+        <a:font script="Syrj" typeface="Estrangelo Edessa"/>
+        <a:font script="Syre" typeface="Estrangelo Edessa"/>
+        <a:font script="Sora" typeface="Nirmala UI"/>
+        <a:font script="Tale" typeface="Microsoft Tai Le"/>
+        <a:font script="Talu" typeface="Microsoft New Tai Lue"/>
+        <a:font script="Tfng" typeface="Ebrima"/>
+      </a:majorFont>
+      <a:minorFont>
+        <a:latin typeface="Calibri" panose="020F0502020204030204"/>
+        <a:ea typeface=""/>
+        <a:cs typeface=""/>
+        <a:font script="Jpan" typeface="游ゴシック"/>
+        <a:font script="Hang" typeface="맑은 고딕"/>
+        <a:font script="Hans" typeface="等线"/>
+        <a:font script="Hant" typeface="新細明體"/>
+        <a:font script="Arab" typeface="Arial"/>
+        <a:font script="Hebr" typeface="Arial"/>
+        <a:font script="Thai" typeface="Cordia New"/>
+        <a:font script="Ethi" typeface="Nyala"/>
+        <a:font script="Beng" typeface="Vrinda"/>
+        <a:font script="Gujr" typeface="Shruti"/>
+        <a:font script="Khmr" typeface="DaunPenh"/>
+        <a:font script="Knda" typeface="Tunga"/>
+        <a:font script="Guru" typeface="Raavi"/>
+        <a:font script="Cans" typeface="Euphemia"/>
+        <a:font script="Cher" typeface="Plantagenet Cherokee"/>
+        <a:font script="Yiii" typeface="Microsoft Yi Baiti"/>
+        <a:font script="Tibt" typeface="Microsoft Himalaya"/>
+        <a:font script="Thaa" typeface="MV Boli"/>
+        <a:font script="Deva" typeface="Mangal"/>
+        <a:font script="Telu" typeface="Gautami"/>
+        <a:font script="Taml" typeface="Latha"/>
+        <a:font script="Syrc" typeface="Estrangelo Edessa"/>
+        <a:font script="Orya" typeface="Kalinga"/>
+        <a:font script="Mlym" typeface="Kartika"/>
+        <a:font script="Laoo" typeface="DokChampa"/>
+        <a:font script="Sinh" typeface="Iskoola Pota"/>
+        <a:font script="Mong" typeface="Mongolian Baiti"/>
+        <a:font script="Viet" typeface="Arial"/>
+        <a:font script="Uigh" typeface="Microsoft Uighur"/>
+        <a:font script="Geor" typeface="Sylfaen"/>
+        <a:font script="Armn" typeface="Arial"/>
+        <a:font script="Bugi" typeface="Leelawadee UI"/>
+        <a:font script="Bopo" typeface="Microsoft JhengHei"/>
+        <a:font script="Java" typeface="Javanese Text"/>
+        <a:font script="Lisu" typeface="Segoe UI"/>
+        <a:font script="Mymr" typeface="Myanmar Text"/>
+        <a:font script="Nkoo" typeface="Ebrima"/>
+        <a:font script="Olck" typeface="Nirmala UI"/>
+        <a:font script="Osma" typeface="Ebrima"/>
+        <a:font script="Phag" typeface="Phagspa"/>
+        <a:font script="Syrn" typeface="Estrangelo Edessa"/>
+        <a:font script="Syrj" typeface="Estrangelo Edessa"/>
+        <a:font script="Syre" typeface="Estrangelo Edessa"/>
+        <a:font script="Sora" typeface="Nirmala UI"/>
+        <a:font script="Tale" typeface="Microsoft Tai Le"/>
+        <a:font script="Talu" typeface="Microsoft New Tai Lue"/>
+        <a:font script="Tfng" typeface="Ebrima"/>
+      </a:minorFont>
+    </a:fontScheme>
+    <a:fmtScheme name="Office">
+      <a:fillStyleLst>
+        <a:solidFill>
+          <a:schemeClr val="phClr"/>
+        </a:solidFill>
+        <a:gradFill rotWithShape="1">
+          <a:gsLst>
+            <a:gs pos="0">
+              <a:schemeClr val="phClr">
+                <a:lumMod val="110000"/>
+                <a:satMod val="105000"/>
+                <a:tint val="67000"/>
+              </a:schemeClr>
+            </a:gs>
+            <a:gs pos="50000">
+              <a:schemeClr val="phClr">
+                <a:lumMod val="105000"/>
+                <a:satMod val="103000"/>
+                <a:tint val="73000"/>
+              </a:schemeClr>
+            </a:gs>
+            <a:gs pos="100000">
+              <a:schemeClr val="phClr">
+                <a:lumMod val="105000"/>
+                <a:satMod val="109000"/>
+                <a:tint val="81000"/>
+              </a:schemeClr>
+            </a:gs>
+          </a:gsLst>
+          <a:lin ang="5400000" scaled="0"/>
+        </a:gradFill>
+        <a:gradFill rotWithShape="1">
+          <a:gsLst>
+            <a:gs pos="0">
+              <a:schemeClr val="phClr">
+                <a:satMod val="103000"/>
+                <a:lumMod val="102000"/>
+                <a:tint val="94000"/>
+              </a:schemeClr>
+            </a:gs>
+            <a:gs pos="50000">
+              <a:schemeClr val="phClr">
+                <a:satMod val="110000"/>
+                <a:lumMod val="100000"/>
+                <a:shade val="100000"/>
+              </a:schemeClr>
+            </a:gs>
+            <a:gs pos="100000">
+              <a:schemeClr val="phClr">
+                <a:lumMod val="99000"/>
+                <a:satMod val="120000"/>
+                <a:shade val="78000"/>
+              </a:schemeClr>
+            </a:gs>
+          </a:gsLst>
+          <a:lin ang="5400000" scaled="0"/>
+        </a:gradFill>
+      </a:fillStyleLst>
+      <a:lnStyleLst>
+        <a:ln w="6350" cap="flat" cmpd="sng" algn="ctr">
+          <a:solidFill>
+            <a:schemeClr val="phClr"/>
+          </a:solidFill>
+          <a:prstDash val="solid"/>
+          <a:miter lim="800000"/>
+        </a:ln>
+        <a:ln w="12700" cap="flat" cmpd="sng" algn="ctr">
+          <a:solidFill>
+            <a:schemeClr val="phClr"/>
+          </a:solidFill>
+          <a:prstDash val="solid"/>
+          <a:miter lim="800000"/>
+        </a:ln>
+        <a:ln w="19050" cap="flat" cmpd="sng" algn="ctr">
+          <a:solidFill>
+            <a:schemeClr val="phClr"/>
+          </a:solidFill>
+          <a:prstDash val="solid"/>
+          <a:miter lim="800000"/>
+        </a:ln>
+      </a:lnStyleLst>
+      <a:effectStyleLst>
+        <a:effectStyle>
+          <a:effectLst/>
+        </a:effectStyle>
+        <a:effectStyle>
+          <a:effectLst/>
+        </a:effectStyle>
+        <a:effectStyle>
+          <a:effectLst>
+            <a:outerShdw blurRad="57150" dist="19050" dir="5400000" algn="ctr" rotWithShape="0">
+              <a:srgbClr val="000000">
+                <a:alpha val="63000"/>
+              </a:srgbClr>
+            </a:outerShdw>
+          </a:effectLst>
+        </a:effectStyle>
+      </a:effectStyleLst>
+      <a:bgFillStyleLst>
+        <a:solidFill>
+          <a:schemeClr val="phClr"/>
+        </a:solidFill>
+        <a:solidFill>
+          <a:schemeClr val="phClr">
+            <a:tint val="95000"/>
+            <a:satMod val="170000"/>
+          </a:schemeClr>
+        </a:solidFill>
+        <a:gradFill rotWithShape="1">
+          <a:gsLst>
+            <a:gs pos="0">
+              <a:schemeClr val="phClr">
+                <a:tint val="93000"/>
+                <a:satMod val="150000"/>
+                <a:shade val="98000"/>
+                <a:lumMod val="102000"/>
+              </a:schemeClr>
+            </a:gs>
+            <a:gs pos="50000">
+              <a:schemeClr val="phClr">
+                <a:tint val="98000"/>
+                <a:satMod val="130000"/>
+                <a:shade val="90000"/>
+                <a:lumMod val="103000"/>
+              </a:schemeClr>
+            </a:gs>
+            <a:gs pos="100000">
+              <a:schemeClr val="phClr">
+                <a:shade val="63000"/>
+                <a:satMod val="120000"/>
+              </a:schemeClr>
+            </a:gs>
+          </a:gsLst>
+          <a:lin ang="5400000" scaled="0"/>
+        </a:gradFill>
+      </a:bgFillStyleLst>
+    </a:fmtScheme>
+  </a:themeElements>
+  <a:objectDefaults/>
+  <a:extraClrSchemeLst/>
+  <a:extLst>
+    <a:ext uri="{05A4C25C-085E-4340-85A3-A5531E510DB2}">
+      <thm15:themeFamily xmlns:thm15="http://schemas.microsoft.com/office/thememl/2012/main" name="Office Theme" id="{62F939B6-93AF-4DB8-9C6B-D6C7DFDC589F}" vid="{4A3C46E8-61CC-4603-A589-7422A47A8E4A}"/>
+    </a:ext>
+  </a:extLst>
+</a:theme>
 </file>
</xml_diff>